<commit_message>
add presentaion 07 - Math, Random, Objects methods
</commit_message>
<xml_diff>
--- a/Prezentace/PGM_06.pptx
+++ b/Prezentace/PGM_06.pptx
@@ -874,7 +874,7 @@
             <a:fld id="{B61BEF0D-F0BB-DE4B-95CE-6DB70DBA9567}" type="datetimeFigureOut">
               <a:rPr lang="en-US" dirty="0"/>
               <a:pPr/>
-              <a:t>10/25/2020</a:t>
+              <a:t>11/3/2020</a:t>
             </a:fld>
             <a:endParaRPr lang="en-US" dirty="0"/>
           </a:p>
@@ -1122,7 +1122,7 @@
             <a:fld id="{B61BEF0D-F0BB-DE4B-95CE-6DB70DBA9567}" type="datetimeFigureOut">
               <a:rPr lang="en-US" dirty="0"/>
               <a:pPr/>
-              <a:t>10/25/2020</a:t>
+              <a:t>11/3/2020</a:t>
             </a:fld>
             <a:endParaRPr lang="en-US" dirty="0"/>
           </a:p>
@@ -1433,7 +1433,7 @@
             <a:fld id="{B61BEF0D-F0BB-DE4B-95CE-6DB70DBA9567}" type="datetimeFigureOut">
               <a:rPr lang="en-US" dirty="0"/>
               <a:pPr/>
-              <a:t>10/25/2020</a:t>
+              <a:t>11/3/2020</a:t>
             </a:fld>
             <a:endParaRPr lang="en-US" dirty="0"/>
           </a:p>
@@ -1763,7 +1763,7 @@
             <a:fld id="{B61BEF0D-F0BB-DE4B-95CE-6DB70DBA9567}" type="datetimeFigureOut">
               <a:rPr lang="en-US" dirty="0"/>
               <a:pPr/>
-              <a:t>10/25/2020</a:t>
+              <a:t>11/3/2020</a:t>
             </a:fld>
             <a:endParaRPr lang="en-US" dirty="0"/>
           </a:p>
@@ -2074,7 +2074,7 @@
             <a:fld id="{B61BEF0D-F0BB-DE4B-95CE-6DB70DBA9567}" type="datetimeFigureOut">
               <a:rPr lang="en-US" dirty="0"/>
               <a:pPr/>
-              <a:t>10/25/2020</a:t>
+              <a:t>11/3/2020</a:t>
             </a:fld>
             <a:endParaRPr lang="en-US" dirty="0"/>
           </a:p>
@@ -2464,7 +2464,7 @@
             <a:fld id="{B61BEF0D-F0BB-DE4B-95CE-6DB70DBA9567}" type="datetimeFigureOut">
               <a:rPr lang="en-US" dirty="0"/>
               <a:pPr/>
-              <a:t>10/25/2020</a:t>
+              <a:t>11/3/2020</a:t>
             </a:fld>
             <a:endParaRPr lang="en-US" dirty="0"/>
           </a:p>
@@ -2630,7 +2630,7 @@
           <a:p>
             <a:fld id="{55C6B4A9-1611-4792-9094-5F34BCA07E0B}" type="datetimeFigureOut">
               <a:rPr lang="en-US" dirty="0"/>
-              <a:t>10/25/2020</a:t>
+              <a:t>11/3/2020</a:t>
             </a:fld>
             <a:endParaRPr lang="en-US" dirty="0"/>
           </a:p>
@@ -2806,7 +2806,7 @@
             <a:fld id="{B61BEF0D-F0BB-DE4B-95CE-6DB70DBA9567}" type="datetimeFigureOut">
               <a:rPr lang="en-US" dirty="0"/>
               <a:pPr/>
-              <a:t>10/25/2020</a:t>
+              <a:t>11/3/2020</a:t>
             </a:fld>
             <a:endParaRPr lang="en-US" dirty="0"/>
           </a:p>
@@ -2972,7 +2972,7 @@
           <a:p>
             <a:fld id="{42A54C80-263E-416B-A8E0-580EDEADCBDC}" type="datetimeFigureOut">
               <a:rPr lang="en-US" dirty="0"/>
-              <a:t>10/25/2020</a:t>
+              <a:t>11/3/2020</a:t>
             </a:fld>
             <a:endParaRPr lang="en-US" dirty="0"/>
           </a:p>
@@ -3215,7 +3215,7 @@
             <a:fld id="{B61BEF0D-F0BB-DE4B-95CE-6DB70DBA9567}" type="datetimeFigureOut">
               <a:rPr lang="en-US" dirty="0"/>
               <a:pPr/>
-              <a:t>10/25/2020</a:t>
+              <a:t>11/3/2020</a:t>
             </a:fld>
             <a:endParaRPr lang="en-US" dirty="0"/>
           </a:p>
@@ -3443,7 +3443,7 @@
           <a:p>
             <a:fld id="{42A54C80-263E-416B-A8E0-580EDEADCBDC}" type="datetimeFigureOut">
               <a:rPr lang="en-US" dirty="0"/>
-              <a:t>10/25/2020</a:t>
+              <a:t>11/3/2020</a:t>
             </a:fld>
             <a:endParaRPr lang="en-US" dirty="0"/>
           </a:p>
@@ -3813,7 +3813,7 @@
             <a:fld id="{B61BEF0D-F0BB-DE4B-95CE-6DB70DBA9567}" type="datetimeFigureOut">
               <a:rPr lang="en-US" dirty="0"/>
               <a:pPr/>
-              <a:t>10/25/2020</a:t>
+              <a:t>11/3/2020</a:t>
             </a:fld>
             <a:endParaRPr lang="en-US" dirty="0"/>
           </a:p>
@@ -3933,7 +3933,7 @@
             <a:fld id="{B61BEF0D-F0BB-DE4B-95CE-6DB70DBA9567}" type="datetimeFigureOut">
               <a:rPr lang="en-US" dirty="0"/>
               <a:pPr/>
-              <a:t>10/25/2020</a:t>
+              <a:t>11/3/2020</a:t>
             </a:fld>
             <a:endParaRPr lang="en-US" dirty="0"/>
           </a:p>
@@ -4025,7 +4025,7 @@
             <a:fld id="{B61BEF0D-F0BB-DE4B-95CE-6DB70DBA9567}" type="datetimeFigureOut">
               <a:rPr lang="en-US" dirty="0"/>
               <a:pPr/>
-              <a:t>10/25/2020</a:t>
+              <a:t>11/3/2020</a:t>
             </a:fld>
             <a:endParaRPr lang="en-US" dirty="0"/>
           </a:p>
@@ -4276,7 +4276,7 @@
           <a:p>
             <a:fld id="{42A54C80-263E-416B-A8E0-580EDEADCBDC}" type="datetimeFigureOut">
               <a:rPr lang="en-US" dirty="0"/>
-              <a:t>10/25/2020</a:t>
+              <a:t>11/3/2020</a:t>
             </a:fld>
             <a:endParaRPr lang="en-US" dirty="0"/>
           </a:p>
@@ -4578,7 +4578,7 @@
             <a:fld id="{B61BEF0D-F0BB-DE4B-95CE-6DB70DBA9567}" type="datetimeFigureOut">
               <a:rPr lang="en-US" dirty="0"/>
               <a:pPr/>
-              <a:t>10/25/2020</a:t>
+              <a:t>11/3/2020</a:t>
             </a:fld>
             <a:endParaRPr lang="en-US" dirty="0"/>
           </a:p>
@@ -5276,7 +5276,7 @@
             <a:fld id="{B61BEF0D-F0BB-DE4B-95CE-6DB70DBA9567}" type="datetimeFigureOut">
               <a:rPr lang="en-US" dirty="0"/>
               <a:pPr/>
-              <a:t>10/25/2020</a:t>
+              <a:t>11/3/2020</a:t>
             </a:fld>
             <a:endParaRPr lang="en-US" dirty="0"/>
           </a:p>
@@ -6091,7 +6091,7 @@
         </p:blipFill>
         <p:spPr>
           <a:xfrm>
-            <a:off x="2143931" y="4179133"/>
+            <a:off x="2143931" y="4193201"/>
             <a:ext cx="5663474" cy="2678867"/>
           </a:xfrm>
           <a:prstGeom prst="rect">
@@ -6266,8 +6266,8 @@
         </p:blipFill>
         <p:spPr>
           <a:xfrm>
-            <a:off x="1960558" y="3162416"/>
-            <a:ext cx="6030219" cy="3695584"/>
+            <a:off x="2227878" y="3157497"/>
+            <a:ext cx="5776966" cy="3540379"/>
           </a:xfrm>
           <a:prstGeom prst="rect">
             <a:avLst/>
@@ -6695,8 +6695,8 @@
         </p:blipFill>
         <p:spPr>
           <a:xfrm>
-            <a:off x="2141329" y="1949043"/>
-            <a:ext cx="5668677" cy="4908957"/>
+            <a:off x="2193688" y="1932622"/>
+            <a:ext cx="5563960" cy="4818274"/>
           </a:xfrm>
           <a:prstGeom prst="rect">
             <a:avLst/>
@@ -6868,7 +6868,7 @@
             </a:r>
             <a:r>
               <a:rPr lang="cs-CZ" dirty="0"/>
-              <a:t> pro vrácení hodnoty, kterou pomocí funkce získáme</a:t>
+              <a:t> pro vrácení hodnoty, kterou pomocí funkce získáváme</a:t>
             </a:r>
           </a:p>
           <a:p>
@@ -9432,13 +9432,13 @@
             <p:ph idx="1"/>
             <p:extLst>
               <p:ext uri="{D42A27DB-BD31-4B8C-83A1-F6EECF244321}">
-                <p14:modId xmlns:p14="http://schemas.microsoft.com/office/powerpoint/2010/main" val="3442275242"/>
+                <p14:modId xmlns:p14="http://schemas.microsoft.com/office/powerpoint/2010/main" val="4210629204"/>
               </p:ext>
             </p:extLst>
           </p:nvPr>
         </p:nvGraphicFramePr>
         <p:xfrm>
-          <a:off x="460978" y="1965203"/>
+          <a:off x="454855" y="2085523"/>
           <a:ext cx="11282289" cy="4095993"/>
         </p:xfrm>
         <a:graphic>
@@ -9524,7 +9524,7 @@
                     <a:p>
                       <a:pPr algn="ctr"/>
                       <a:r>
-                        <a:rPr lang="cs-CZ" sz="1600" b="1"/>
+                        <a:rPr lang="cs-CZ" sz="1600" b="1" dirty="0"/>
                         <a:t>+</a:t>
                       </a:r>
                     </a:p>
@@ -9689,7 +9689,7 @@
                     <a:p>
                       <a:pPr algn="ctr"/>
                       <a:r>
-                        <a:rPr lang="cs-CZ" sz="1600" b="1"/>
+                        <a:rPr lang="cs-CZ" sz="1600" b="1" dirty="0"/>
                         <a:t>/</a:t>
                       </a:r>
                     </a:p>
@@ -9736,7 +9736,7 @@
                     <a:p>
                       <a:pPr algn="ctr"/>
                       <a:r>
-                        <a:rPr lang="cs-CZ" sz="1600" b="1"/>
+                        <a:rPr lang="cs-CZ" sz="1600" b="1" dirty="0"/>
                         <a:t>%</a:t>
                       </a:r>
                     </a:p>
@@ -10038,7 +10038,7 @@
                   </a:ext>
                 </a:extLst>
               </a:tr>
-              <a:tr h="356029">
+              <a:tr h="518642">
                 <a:tc>
                   <a:txBody>
                     <a:bodyPr/>
@@ -10451,7 +10451,7 @@
         </p:blipFill>
         <p:spPr>
           <a:xfrm>
-            <a:off x="1407204" y="3836233"/>
+            <a:off x="1407204" y="3571538"/>
             <a:ext cx="7136928" cy="2972737"/>
           </a:xfrm>
           <a:prstGeom prst="rect">
@@ -10550,7 +10550,7 @@
           <a:p>
             <a:r>
               <a:rPr lang="cs-CZ" dirty="0"/>
-              <a:t>Rozhraní konzole lze využít pro komunikace uživatel s aplikací</a:t>
+              <a:t>Rozhraní konzole lze využít pro komunikace uživatele s aplikací</a:t>
             </a:r>
           </a:p>
           <a:p>

</xml_diff>